<commit_message>
Side bar read and post
</commit_message>
<xml_diff>
--- a/React/side-bar/Side-bar.pptx
+++ b/React/side-bar/Side-bar.pptx
@@ -8819,7 +8819,7 @@
                 </a:solidFill>
                 <a:latin typeface="Open Sans" panose="020B0606030504020204" pitchFamily="34" charset="0"/>
               </a:rPr>
-              <a:t>Nav bar</a:t>
+              <a:t>Side Nav bar</a:t>
             </a:r>
             <a:endParaRPr lang="en-US" sz="5280" dirty="0"/>
           </a:p>
@@ -9470,7 +9470,7 @@
                 </a:solidFill>
                 <a:latin typeface="Open Sans" panose="020B0606030504020204" pitchFamily="34" charset="0"/>
               </a:rPr>
-              <a:t>Nav bar</a:t>
+              <a:t>Side Nav bar</a:t>
             </a:r>
             <a:endParaRPr lang="en-US" sz="5280" dirty="0"/>
           </a:p>
@@ -9708,17 +9708,7 @@
                 <a:latin typeface="Consolas" panose="020B0609020204030204" pitchFamily="49" charset="0"/>
                 <a:hlinkClick r:id="rId3"/>
               </a:rPr>
-              <a:t>https://github.com/asadhasnain/tips/tree/master/React/</a:t>
-            </a:r>
-            <a:r>
-              <a:rPr lang="en-US" sz="3227" dirty="0">
-                <a:solidFill>
-                  <a:schemeClr val="accent1"/>
-                </a:solidFill>
-                <a:latin typeface="Consolas" panose="020B0609020204030204" pitchFamily="49" charset="0"/>
-                <a:hlinkClick r:id="rId4"/>
-              </a:rPr>
-              <a:t>side-bar</a:t>
+              <a:t>https://github.com/asadhasnain/tips/tree/master/React/side-bar</a:t>
             </a:r>
             <a:endParaRPr lang="en-US" sz="3227" dirty="0">
               <a:solidFill>
@@ -9733,6 +9723,64 @@
                 <a:schemeClr val="accent1"/>
               </a:solidFill>
               <a:latin typeface="Consolas" panose="020B0609020204030204" pitchFamily="49" charset="0"/>
+            </a:endParaRPr>
+          </a:p>
+        </p:txBody>
+      </p:sp>
+      <p:sp>
+        <p:nvSpPr>
+          <p:cNvPr id="8" name="Rectangle: Rounded Corners 7">
+            <a:extLst>
+              <a:ext uri="{FF2B5EF4-FFF2-40B4-BE49-F238E27FC236}">
+                <a16:creationId xmlns:a16="http://schemas.microsoft.com/office/drawing/2014/main" id="{F5687ACF-E399-4A7D-8667-209E954BD898}"/>
+              </a:ext>
+            </a:extLst>
+          </p:cNvPr>
+          <p:cNvSpPr/>
+          <p:nvPr/>
+        </p:nvSpPr>
+        <p:spPr>
+          <a:xfrm>
+            <a:off x="157728" y="124340"/>
+            <a:ext cx="1302376" cy="1212166"/>
+          </a:xfrm>
+          <a:prstGeom prst="roundRect">
+            <a:avLst/>
+          </a:prstGeom>
+        </p:spPr>
+        <p:style>
+          <a:lnRef idx="2">
+            <a:schemeClr val="accent1">
+              <a:shade val="50000"/>
+            </a:schemeClr>
+          </a:lnRef>
+          <a:fillRef idx="1">
+            <a:schemeClr val="accent1"/>
+          </a:fillRef>
+          <a:effectRef idx="0">
+            <a:schemeClr val="accent1"/>
+          </a:effectRef>
+          <a:fontRef idx="minor">
+            <a:schemeClr val="lt1"/>
+          </a:fontRef>
+        </p:style>
+        <p:txBody>
+          <a:bodyPr rtlCol="0" anchor="ctr"/>
+          <a:lstStyle/>
+          <a:p>
+            <a:pPr algn="ctr"/>
+            <a:r>
+              <a:rPr lang="en-US" sz="3200" b="1" dirty="0">
+                <a:solidFill>
+                  <a:schemeClr val="bg1"/>
+                </a:solidFill>
+              </a:rPr>
+              <a:t>React</a:t>
+            </a:r>
+            <a:endParaRPr lang="en-US" sz="880" b="1" dirty="0">
+              <a:solidFill>
+                <a:schemeClr val="bg1"/>
+              </a:solidFill>
             </a:endParaRPr>
           </a:p>
         </p:txBody>

</xml_diff>